<commit_message>
[lab2] full skeleton - [lab3] commands
</commit_message>
<xml_diff>
--- a/lab3/Lab 3_2016.pptx
+++ b/lab3/Lab 3_2016.pptx
@@ -122,6 +122,22 @@
       </a:defRPr>
     </a:lvl9pPr>
   </p:defaultTextStyle>
+  <p:extLst>
+    <p:ext uri="{EFAFB233-063F-42B5-8137-9DF3F51BA10A}">
+      <p15:sldGuideLst xmlns:p15="http://schemas.microsoft.com/office/powerpoint/2012/main">
+        <p15:guide id="1" orient="horz" pos="2160">
+          <p15:clr>
+            <a:srgbClr val="A4A3A4"/>
+          </p15:clr>
+        </p15:guide>
+        <p15:guide id="2" pos="2880">
+          <p15:clr>
+            <a:srgbClr val="A4A3A4"/>
+          </p15:clr>
+        </p15:guide>
+      </p15:sldGuideLst>
+    </p:ext>
+  </p:extLst>
 </p:presentation>
 </file>
 
@@ -306,7 +322,7 @@
           <a:p>
             <a:fld id="{9F9DF499-587E-41D6-981E-71CE40182188}" type="datetimeFigureOut">
               <a:rPr lang="sv-SE" smtClean="0"/>
-              <a:t>19/11/16</a:t>
+              <a:t>2016-12-11</a:t>
             </a:fld>
             <a:endParaRPr lang="sv-SE"/>
           </a:p>
@@ -476,7 +492,7 @@
           <a:p>
             <a:fld id="{9F9DF499-587E-41D6-981E-71CE40182188}" type="datetimeFigureOut">
               <a:rPr lang="sv-SE" smtClean="0"/>
-              <a:t>19/11/16</a:t>
+              <a:t>2016-12-11</a:t>
             </a:fld>
             <a:endParaRPr lang="sv-SE"/>
           </a:p>
@@ -656,7 +672,7 @@
           <a:p>
             <a:fld id="{9F9DF499-587E-41D6-981E-71CE40182188}" type="datetimeFigureOut">
               <a:rPr lang="sv-SE" smtClean="0"/>
-              <a:t>19/11/16</a:t>
+              <a:t>2016-12-11</a:t>
             </a:fld>
             <a:endParaRPr lang="sv-SE"/>
           </a:p>
@@ -826,7 +842,7 @@
           <a:p>
             <a:fld id="{9F9DF499-587E-41D6-981E-71CE40182188}" type="datetimeFigureOut">
               <a:rPr lang="sv-SE" smtClean="0"/>
-              <a:t>19/11/16</a:t>
+              <a:t>2016-12-11</a:t>
             </a:fld>
             <a:endParaRPr lang="sv-SE"/>
           </a:p>
@@ -1072,7 +1088,7 @@
           <a:p>
             <a:fld id="{9F9DF499-587E-41D6-981E-71CE40182188}" type="datetimeFigureOut">
               <a:rPr lang="sv-SE" smtClean="0"/>
-              <a:t>19/11/16</a:t>
+              <a:t>2016-12-11</a:t>
             </a:fld>
             <a:endParaRPr lang="sv-SE"/>
           </a:p>
@@ -1360,7 +1376,7 @@
           <a:p>
             <a:fld id="{9F9DF499-587E-41D6-981E-71CE40182188}" type="datetimeFigureOut">
               <a:rPr lang="sv-SE" smtClean="0"/>
-              <a:t>19/11/16</a:t>
+              <a:t>2016-12-11</a:t>
             </a:fld>
             <a:endParaRPr lang="sv-SE"/>
           </a:p>
@@ -1782,7 +1798,7 @@
           <a:p>
             <a:fld id="{9F9DF499-587E-41D6-981E-71CE40182188}" type="datetimeFigureOut">
               <a:rPr lang="sv-SE" smtClean="0"/>
-              <a:t>19/11/16</a:t>
+              <a:t>2016-12-11</a:t>
             </a:fld>
             <a:endParaRPr lang="sv-SE"/>
           </a:p>
@@ -1900,7 +1916,7 @@
           <a:p>
             <a:fld id="{9F9DF499-587E-41D6-981E-71CE40182188}" type="datetimeFigureOut">
               <a:rPr lang="sv-SE" smtClean="0"/>
-              <a:t>19/11/16</a:t>
+              <a:t>2016-12-11</a:t>
             </a:fld>
             <a:endParaRPr lang="sv-SE"/>
           </a:p>
@@ -1995,7 +2011,7 @@
           <a:p>
             <a:fld id="{9F9DF499-587E-41D6-981E-71CE40182188}" type="datetimeFigureOut">
               <a:rPr lang="sv-SE" smtClean="0"/>
-              <a:t>19/11/16</a:t>
+              <a:t>2016-12-11</a:t>
             </a:fld>
             <a:endParaRPr lang="sv-SE"/>
           </a:p>
@@ -2272,7 +2288,7 @@
           <a:p>
             <a:fld id="{9F9DF499-587E-41D6-981E-71CE40182188}" type="datetimeFigureOut">
               <a:rPr lang="sv-SE" smtClean="0"/>
-              <a:t>19/11/16</a:t>
+              <a:t>2016-12-11</a:t>
             </a:fld>
             <a:endParaRPr lang="sv-SE"/>
           </a:p>
@@ -2525,7 +2541,7 @@
           <a:p>
             <a:fld id="{9F9DF499-587E-41D6-981E-71CE40182188}" type="datetimeFigureOut">
               <a:rPr lang="sv-SE" smtClean="0"/>
-              <a:t>19/11/16</a:t>
+              <a:t>2016-12-11</a:t>
             </a:fld>
             <a:endParaRPr lang="sv-SE"/>
           </a:p>
@@ -2738,7 +2754,7 @@
           <a:p>
             <a:fld id="{9F9DF499-587E-41D6-981E-71CE40182188}" type="datetimeFigureOut">
               <a:rPr lang="sv-SE" smtClean="0"/>
-              <a:t>19/11/16</a:t>
+              <a:t>2016-12-11</a:t>
             </a:fld>
             <a:endParaRPr lang="sv-SE"/>
           </a:p>
@@ -3169,6 +3185,13 @@
   <p:clrMapOvr>
     <a:masterClrMapping/>
   </p:clrMapOvr>
+  <p:timing>
+    <p:tnLst>
+      <p:par>
+        <p:cTn id="1" dur="indefinite" restart="never" nodeType="tmRoot"/>
+      </p:par>
+    </p:tnLst>
+  </p:timing>
 </p:sld>
 </file>
 
@@ -3255,11 +3278,7 @@
             <a:pPr lvl="1"/>
             <a:r>
               <a:rPr lang="en-US" dirty="0" smtClean="0"/>
-              <a:t>Then becomes </a:t>
-            </a:r>
-            <a:r>
-              <a:rPr lang="en-US" dirty="0" smtClean="0"/>
-              <a:t>consistent</a:t>
+              <a:t>Then becomes consistent</a:t>
             </a:r>
           </a:p>
           <a:p>
@@ -3268,7 +3287,6 @@
               <a:rPr lang="en-US" dirty="0" smtClean="0"/>
               <a:t>Delete and Modify still work</a:t>
             </a:r>
-            <a:endParaRPr lang="en-US" dirty="0" smtClean="0"/>
           </a:p>
           <a:p>
             <a:r>
@@ -3279,11 +3297,7 @@
           <a:p>
             <a:r>
               <a:rPr lang="en-US" dirty="0" smtClean="0"/>
-              <a:t>Discuss </a:t>
-            </a:r>
-            <a:r>
-              <a:rPr lang="en-US" dirty="0" smtClean="0"/>
-              <a:t>the cost of your solution, as in Lab 2 </a:t>
+              <a:t>Discuss the cost of your solution, as in Lab 2 </a:t>
             </a:r>
           </a:p>
           <a:p>
@@ -3363,13 +3377,8 @@
           <a:p>
             <a:r>
               <a:rPr lang="en-US" dirty="0" smtClean="0"/>
-              <a:t>You will measure the </a:t>
-            </a:r>
-            <a:r>
-              <a:rPr lang="en-US" dirty="0" smtClean="0"/>
-              <a:t>times it takes for the blackboard to reach consistency.</a:t>
-            </a:r>
-            <a:endParaRPr lang="en-US" dirty="0" smtClean="0"/>
+              <a:t>You will measure the times it takes for the blackboard to reach consistency.</a:t>
+            </a:r>
           </a:p>
           <a:p>
             <a:r>
@@ -3394,36 +3403,19 @@
               <a:rPr lang="en-US" u="sng" dirty="0" smtClean="0"/>
               <a:t>at the same time</a:t>
             </a:r>
-            <a:endParaRPr lang="en-US" u="sng" dirty="0" smtClean="0"/>
           </a:p>
           <a:p>
             <a:pPr lvl="1"/>
             <a:r>
               <a:rPr lang="en-US" dirty="0" smtClean="0"/>
-              <a:t>Measure </a:t>
-            </a:r>
-            <a:r>
-              <a:rPr lang="en-US" dirty="0" smtClean="0"/>
-              <a:t>the total </a:t>
-            </a:r>
-            <a:r>
-              <a:rPr lang="en-US" dirty="0" smtClean="0"/>
-              <a:t>time to reach consistency state:</a:t>
+              <a:t>Measure the total time to reach consistency state:</a:t>
             </a:r>
           </a:p>
           <a:p>
             <a:pPr lvl="2"/>
             <a:r>
               <a:rPr lang="en-US" dirty="0" smtClean="0"/>
-              <a:t>the </a:t>
-            </a:r>
-            <a:r>
-              <a:rPr lang="en-US" dirty="0" smtClean="0"/>
-              <a:t>longest time among all vessels</a:t>
-            </a:r>
-            <a:r>
-              <a:rPr lang="en-US" dirty="0" smtClean="0"/>
-              <a:t>.</a:t>
+              <a:t>the longest time among all vessels.</a:t>
             </a:r>
           </a:p>
           <a:p>
@@ -3520,26 +3512,14 @@
             <a:pPr lvl="1"/>
             <a:r>
               <a:rPr lang="en-US" dirty="0" smtClean="0"/>
-              <a:t>Post </a:t>
-            </a:r>
-            <a:r>
-              <a:rPr lang="en-US" dirty="0" smtClean="0"/>
-              <a:t>messages to </a:t>
-            </a:r>
-            <a:r>
-              <a:rPr lang="en-US" dirty="0" smtClean="0"/>
-              <a:t>vessels at (almost) the same time</a:t>
+              <a:t>Post messages to vessels at (almost) the same time</a:t>
             </a:r>
           </a:p>
           <a:p>
             <a:pPr lvl="2"/>
             <a:r>
               <a:rPr lang="en-US" dirty="0" smtClean="0"/>
-              <a:t>Write a shell script or a program to automatically post </a:t>
-            </a:r>
-            <a:r>
-              <a:rPr lang="en-US" dirty="0" smtClean="0"/>
-              <a:t>messages</a:t>
+              <a:t>Write a shell script or a program to automatically post messages</a:t>
             </a:r>
           </a:p>
           <a:p>
@@ -3928,17 +3908,8 @@
             <a:pPr lvl="1"/>
             <a:r>
               <a:rPr lang="en-US" dirty="0" smtClean="0"/>
-              <a:t>Record </a:t>
-            </a:r>
-            <a:r>
-              <a:rPr lang="en-US" dirty="0" smtClean="0"/>
-              <a:t>the time for the Blackboard to reach </a:t>
-            </a:r>
-            <a:r>
-              <a:rPr lang="en-US" dirty="0" smtClean="0"/>
-              <a:t>consistency.</a:t>
-            </a:r>
-            <a:endParaRPr lang="en-US" dirty="0" smtClean="0"/>
+              <a:t>Record the time for the Blackboard to reach consistency.</a:t>
+            </a:r>
           </a:p>
           <a:p>
             <a:pPr lvl="2"/>
@@ -4505,11 +4476,7 @@
           <a:p>
             <a:r>
               <a:rPr lang="en-US" dirty="0" smtClean="0"/>
-              <a:t>Task 2: </a:t>
-            </a:r>
-            <a:r>
-              <a:rPr lang="en-US" dirty="0" smtClean="0"/>
-              <a:t>Measurements</a:t>
+              <a:t>Task 2: Measurements</a:t>
             </a:r>
             <a:endParaRPr lang="sv-SE" dirty="0"/>
           </a:p>
@@ -4536,33 +4503,18 @@
               <a:rPr lang="en-US" dirty="0" smtClean="0"/>
               <a:t>Run the scenario for Lab2 and Lab3 and take the measurements.</a:t>
             </a:r>
-            <a:endParaRPr lang="en-US" dirty="0" smtClean="0"/>
           </a:p>
           <a:p>
             <a:r>
               <a:rPr lang="en-US" dirty="0" smtClean="0"/>
               <a:t>Use 2,4,6,8 and 10 vessels.</a:t>
             </a:r>
-            <a:endParaRPr lang="en-US" dirty="0" smtClean="0"/>
-          </a:p>
-          <a:p>
-            <a:r>
-              <a:rPr lang="en-US" dirty="0" smtClean="0"/>
-              <a:t>Plot a graph: time </a:t>
-            </a:r>
-            <a:r>
-              <a:rPr lang="en-US" dirty="0" smtClean="0"/>
-              <a:t>to reach consistency </a:t>
-            </a:r>
-            <a:r>
-              <a:rPr lang="en-US" dirty="0" smtClean="0"/>
-              <a:t>as a function of the number of </a:t>
-            </a:r>
-            <a:r>
-              <a:rPr lang="en-US" dirty="0" smtClean="0"/>
-              <a:t>vessels.</a:t>
-            </a:r>
-            <a:endParaRPr lang="en-US" dirty="0" smtClean="0"/>
+          </a:p>
+          <a:p>
+            <a:r>
+              <a:rPr lang="en-US" dirty="0" smtClean="0"/>
+              <a:t>Plot a graph: time to reach consistency as a function of the number of vessels.</a:t>
+            </a:r>
           </a:p>
           <a:p>
             <a:r>
@@ -4605,34 +4557,13 @@
             </a:r>
             <a:r>
               <a:rPr lang="en-US" dirty="0" smtClean="0"/>
-              <a:t> </a:t>
-            </a:r>
-            <a:r>
-              <a:rPr lang="en-US" dirty="0" smtClean="0"/>
-              <a:t>file.</a:t>
-            </a:r>
-            <a:endParaRPr lang="en-US" dirty="0" smtClean="0"/>
-          </a:p>
-          <a:p>
-            <a:r>
-              <a:rPr lang="en-US" dirty="0" smtClean="0"/>
-              <a:t>Write a few words </a:t>
-            </a:r>
-            <a:r>
-              <a:rPr lang="en-US" dirty="0" smtClean="0"/>
-              <a:t>explaining the </a:t>
-            </a:r>
-            <a:r>
-              <a:rPr lang="en-US" dirty="0" smtClean="0"/>
-              <a:t>results you </a:t>
-            </a:r>
-            <a:r>
-              <a:rPr lang="en-US" dirty="0" smtClean="0"/>
-              <a:t>see.</a:t>
-            </a:r>
-            <a:r>
-              <a:rPr lang="en-US" dirty="0" smtClean="0"/>
-              <a:t/>
+              <a:t> file.</a:t>
+            </a:r>
+          </a:p>
+          <a:p>
+            <a:r>
+              <a:rPr lang="en-US" dirty="0" smtClean="0"/>
+              <a:t>Write a few words explaining the results you see.</a:t>
             </a:r>
             <a:br>
               <a:rPr lang="en-US" dirty="0" smtClean="0"/>
@@ -6939,7 +6870,7 @@
   <p:timing>
     <p:tnLst>
       <p:par>
-        <p:cTn xmlns:p14="http://schemas.microsoft.com/office/powerpoint/2010/main" id="1" dur="indefinite" restart="never" nodeType="tmRoot"/>
+        <p:cTn id="1" dur="indefinite" restart="never" nodeType="tmRoot"/>
       </p:par>
     </p:tnLst>
   </p:timing>
@@ -7007,7 +6938,6 @@
               <a:rPr lang="en-US" sz="2800" dirty="0" smtClean="0"/>
               <a:t>The blackboards must reach consistency when the two disjoined groups are merged together ( 4 points).</a:t>
             </a:r>
-            <a:endParaRPr lang="en-US" sz="2800" dirty="0" smtClean="0"/>
           </a:p>
           <a:p>
             <a:r>
@@ -7072,7 +7002,7 @@
   <p:timing>
     <p:tnLst>
       <p:par>
-        <p:cTn xmlns:p14="http://schemas.microsoft.com/office/powerpoint/2010/main" id="1" dur="indefinite" restart="never" nodeType="tmRoot"/>
+        <p:cTn id="1" dur="indefinite" restart="never" nodeType="tmRoot"/>
       </p:par>
     </p:tnLst>
   </p:timing>
@@ -7115,11 +7045,7 @@
           <a:p>
             <a:r>
               <a:rPr lang="en-US" dirty="0" smtClean="0"/>
-              <a:t>Optional Task: </a:t>
-            </a:r>
-            <a:r>
-              <a:rPr lang="en-US" dirty="0" smtClean="0"/>
-              <a:t>Network Segmentation</a:t>
+              <a:t>Optional Task: Network Segmentation</a:t>
             </a:r>
             <a:endParaRPr lang="en-US" dirty="0"/>
           </a:p>
@@ -7158,11 +7084,7 @@
             <a:pPr lvl="1"/>
             <a:r>
               <a:rPr lang="en-US" dirty="0" smtClean="0"/>
-              <a:t>Reaches eventual consistency, when the two segments are merged again</a:t>
-            </a:r>
-            <a:r>
-              <a:rPr lang="en-US" dirty="0" smtClean="0"/>
-              <a:t>.</a:t>
+              <a:t>Reaches eventual consistency, when the two segments are merged again.</a:t>
             </a:r>
           </a:p>
           <a:p>
@@ -7174,7 +7096,6 @@
               <a:rPr lang="en-US" sz="2800" dirty="0" smtClean="0"/>
               <a:t> with the graph about the time it takes to merge.</a:t>
             </a:r>
-            <a:endParaRPr lang="en-US" sz="2800" dirty="0" smtClean="0"/>
           </a:p>
           <a:p>
             <a:r>
@@ -7203,7 +7124,7 @@
   <p:timing>
     <p:tnLst>
       <p:par>
-        <p:cTn xmlns:p14="http://schemas.microsoft.com/office/powerpoint/2010/main" id="1" dur="indefinite" restart="never" nodeType="tmRoot"/>
+        <p:cTn id="1" dur="indefinite" restart="never" nodeType="tmRoot"/>
       </p:par>
     </p:tnLst>
   </p:timing>
@@ -7406,7 +7327,6 @@
               <a:rPr lang="en-US" dirty="0" smtClean="0"/>
               <a:t>It could happen that different boards show messages in a different order</a:t>
             </a:r>
-            <a:endParaRPr lang="en-US" dirty="0" smtClean="0"/>
           </a:p>
           <a:p>
             <a:r>
@@ -7427,7 +7347,6 @@
               <a:rPr lang="en-US" dirty="0" smtClean="0"/>
               <a:t>The leader gathered all the messages and decided the order</a:t>
             </a:r>
-            <a:endParaRPr lang="en-US" dirty="0" smtClean="0"/>
           </a:p>
           <a:p>
             <a:pPr lvl="1"/>
@@ -7441,7 +7360,6 @@
               <a:rPr lang="en-US" dirty="0" smtClean="0"/>
               <a:t>These are just two extreme cases in the spectrum  of consistency trade offs…</a:t>
             </a:r>
-            <a:endParaRPr lang="en-US" dirty="0" smtClean="0"/>
           </a:p>
         </p:txBody>
       </p:sp>
@@ -7455,6 +7373,13 @@
   <p:clrMapOvr>
     <a:masterClrMapping/>
   </p:clrMapOvr>
+  <p:timing>
+    <p:tnLst>
+      <p:par>
+        <p:cTn id="1" dur="indefinite" restart="never" nodeType="tmRoot"/>
+      </p:par>
+    </p:tnLst>
+  </p:timing>
 </p:sld>
 </file>
 
@@ -7614,11 +7539,7 @@
           <a:p>
             <a:r>
               <a:rPr lang="en-US" dirty="0" smtClean="0"/>
-              <a:t>Loose </a:t>
-            </a:r>
-            <a:r>
-              <a:rPr lang="en-US" dirty="0" smtClean="0"/>
-              <a:t>Consistency</a:t>
+              <a:t>Loose Consistency</a:t>
             </a:r>
           </a:p>
         </p:txBody>
@@ -7846,6 +7767,13 @@
   <p:clrMapOvr>
     <a:masterClrMapping/>
   </p:clrMapOvr>
+  <p:timing>
+    <p:tnLst>
+      <p:par>
+        <p:cTn id="1" dur="indefinite" restart="never" nodeType="tmRoot"/>
+      </p:par>
+    </p:tnLst>
+  </p:timing>
 </p:sld>
 </file>
 
@@ -8016,11 +7944,7 @@
           <a:p>
             <a:r>
               <a:rPr lang="en-US" dirty="0" smtClean="0"/>
-              <a:t>Loose </a:t>
-            </a:r>
-            <a:r>
-              <a:rPr lang="en-US" dirty="0" smtClean="0"/>
-              <a:t>Consistency</a:t>
+              <a:t>Loose Consistency</a:t>
             </a:r>
           </a:p>
         </p:txBody>
@@ -8339,7 +8263,7 @@
   <p:timing>
     <p:tnLst>
       <p:par>
-        <p:cTn xmlns:p14="http://schemas.microsoft.com/office/powerpoint/2010/main" id="1" dur="indefinite" restart="never" nodeType="tmRoot"/>
+        <p:cTn id="1" dur="indefinite" restart="never" nodeType="tmRoot"/>
       </p:par>
     </p:tnLst>
   </p:timing>
@@ -8514,15 +8438,7 @@
                   <a:srgbClr val="000000"/>
                 </a:solidFill>
               </a:rPr>
-              <a:t> might not see most recent writes in total </a:t>
-            </a:r>
-            <a:r>
-              <a:rPr lang="en-US" dirty="0" smtClean="0">
-                <a:solidFill>
-                  <a:srgbClr val="000000"/>
-                </a:solidFill>
-              </a:rPr>
-              <a:t>order</a:t>
+              <a:t> might not see most recent writes in total order</a:t>
             </a:r>
           </a:p>
           <a:p>
@@ -8548,7 +8464,6 @@
               <a:rPr lang="en-US" dirty="0" smtClean="0"/>
               <a:t>.</a:t>
             </a:r>
-            <a:endParaRPr lang="en-US" dirty="0" smtClean="0"/>
           </a:p>
         </p:txBody>
       </p:sp>
@@ -8562,6 +8477,13 @@
   <p:clrMapOvr>
     <a:masterClrMapping/>
   </p:clrMapOvr>
+  <p:timing>
+    <p:tnLst>
+      <p:par>
+        <p:cTn id="1" dur="indefinite" restart="never" nodeType="tmRoot"/>
+      </p:par>
+    </p:tnLst>
+  </p:timing>
 </p:sld>
 </file>
 
@@ -8687,6 +8609,13 @@
   <p:clrMapOvr>
     <a:masterClrMapping/>
   </p:clrMapOvr>
+  <p:timing>
+    <p:tnLst>
+      <p:par>
+        <p:cTn id="1" dur="indefinite" restart="never" nodeType="tmRoot"/>
+      </p:par>
+    </p:tnLst>
+  </p:timing>
 </p:sld>
 </file>
 
@@ -8775,15 +8704,7 @@
           <a:p>
             <a:r>
               <a:rPr lang="en-US" dirty="0" smtClean="0"/>
-              <a:t>All boards are eventually </a:t>
-            </a:r>
-            <a:r>
-              <a:rPr lang="en-US" dirty="0" smtClean="0"/>
-              <a:t>consistent</a:t>
-            </a:r>
-            <a:r>
-              <a:rPr lang="en-US" dirty="0" smtClean="0"/>
-              <a:t>.</a:t>
+              <a:t>All boards are eventually consistent.</a:t>
             </a:r>
           </a:p>
           <a:p>
@@ -8841,11 +8762,7 @@
           <a:p>
             <a:r>
               <a:rPr lang="en-US" dirty="0" smtClean="0"/>
-              <a:t>Sending </a:t>
-            </a:r>
-            <a:r>
-              <a:rPr lang="en-US" dirty="0" smtClean="0"/>
-              <a:t>messages: </a:t>
+              <a:t>Sending messages: </a:t>
             </a:r>
             <a:r>
               <a:rPr lang="en-US" dirty="0" smtClean="0">
@@ -8853,15 +8770,7 @@
                   <a:srgbClr val="008000"/>
                 </a:solidFill>
               </a:rPr>
-              <a:t>How</a:t>
-            </a:r>
-            <a:r>
-              <a:rPr lang="en-US" dirty="0" smtClean="0">
-                <a:solidFill>
-                  <a:srgbClr val="008000"/>
-                </a:solidFill>
-              </a:rPr>
-              <a:t>-to hints!</a:t>
+              <a:t>How-to hints!</a:t>
             </a:r>
             <a:endParaRPr lang="sv-SE" dirty="0">
               <a:solidFill>
@@ -9016,11 +8925,7 @@
           <a:p>
             <a:r>
               <a:rPr lang="en-US" sz="3000" dirty="0" smtClean="0"/>
-              <a:t>Consider these </a:t>
-            </a:r>
-            <a:r>
-              <a:rPr lang="en-US" sz="3000" dirty="0" smtClean="0"/>
-              <a:t>cases:</a:t>
+              <a:t>Consider these cases:</a:t>
             </a:r>
           </a:p>
           <a:p>
@@ -9086,23 +8991,7 @@
             <a:pPr lvl="2"/>
             <a:r>
               <a:rPr lang="en-US" sz="2600" dirty="0" smtClean="0"/>
-              <a:t>It can happen </a:t>
-            </a:r>
-            <a:r>
-              <a:rPr lang="en-US" sz="2600" dirty="0" smtClean="0"/>
-              <a:t>in </a:t>
-            </a:r>
-            <a:r>
-              <a:rPr lang="en-US" sz="2600" dirty="0" smtClean="0"/>
-              <a:t>eventua</a:t>
-            </a:r>
-            <a:r>
-              <a:rPr lang="en-US" sz="2600" dirty="0" smtClean="0"/>
-              <a:t>l consistency</a:t>
-            </a:r>
-            <a:r>
-              <a:rPr lang="en-US" sz="2600" dirty="0" smtClean="0"/>
-              <a:t>!</a:t>
+              <a:t>It can happen in eventual consistency!</a:t>
             </a:r>
             <a:endParaRPr lang="en-US" sz="2600" dirty="0"/>
           </a:p>
@@ -9120,11 +9009,7 @@
             <a:pPr lvl="1"/>
             <a:r>
               <a:rPr lang="en-US" sz="2600" dirty="0" smtClean="0"/>
-              <a:t>keep </a:t>
-            </a:r>
-            <a:r>
-              <a:rPr lang="en-US" sz="2600" dirty="0" smtClean="0"/>
-              <a:t>a history </a:t>
+              <a:t>keep a history </a:t>
             </a:r>
             <a:r>
               <a:rPr lang="en-US" sz="2600" dirty="0"/>
@@ -9166,7 +9051,7 @@
   <p:timing>
     <p:tnLst>
       <p:par>
-        <p:cTn xmlns:p14="http://schemas.microsoft.com/office/powerpoint/2010/main" id="1" dur="indefinite" restart="never" nodeType="tmRoot"/>
+        <p:cTn id="1" dur="indefinite" restart="never" nodeType="tmRoot"/>
       </p:par>
     </p:tnLst>
   </p:timing>

</xml_diff>